<commit_message>
just about done with the feedback from michelle from yesterday. More improvements need to be made but here we are.
</commit_message>
<xml_diff>
--- a/Model Progression.pptx
+++ b/Model Progression.pptx
@@ -6,9 +6,9 @@
   </p:sldMasterIdLst>
   <p:sldIdLst>
     <p:sldId id="257" r:id="rId2"/>
-    <p:sldId id="258" r:id="rId3"/>
-    <p:sldId id="261" r:id="rId4"/>
-    <p:sldId id="262" r:id="rId5"/>
+    <p:sldId id="263" r:id="rId3"/>
+    <p:sldId id="265" r:id="rId4"/>
+    <p:sldId id="266" r:id="rId5"/>
   </p:sldIdLst>
   <p:sldSz cx="3200400" cy="3657600"/>
   <p:notesSz cx="6858000" cy="9144000"/>
@@ -107,6 +107,11 @@
       </a:defRPr>
     </a:lvl9pPr>
   </p:defaultTextStyle>
+  <p:extLst>
+    <p:ext uri="{EFAFB233-063F-42B5-8137-9DF3F51BA10A}">
+      <p15:sldGuideLst xmlns:p15="http://schemas.microsoft.com/office/powerpoint/2012/main"/>
+    </p:ext>
+  </p:extLst>
 </p:presentation>
 </file>
 
@@ -241,7 +246,7 @@
           <a:p>
             <a:fld id="{5B3499D5-C268-0F49-9415-6FD9F1032B06}" type="datetimeFigureOut">
               <a:rPr lang="en-US" smtClean="0"/>
-              <a:t>8/31/22</a:t>
+              <a:t>9/1/22</a:t>
             </a:fld>
             <a:endParaRPr lang="en-US"/>
           </a:p>
@@ -411,7 +416,7 @@
           <a:p>
             <a:fld id="{5B3499D5-C268-0F49-9415-6FD9F1032B06}" type="datetimeFigureOut">
               <a:rPr lang="en-US" smtClean="0"/>
-              <a:t>8/31/22</a:t>
+              <a:t>9/1/22</a:t>
             </a:fld>
             <a:endParaRPr lang="en-US"/>
           </a:p>
@@ -591,7 +596,7 @@
           <a:p>
             <a:fld id="{5B3499D5-C268-0F49-9415-6FD9F1032B06}" type="datetimeFigureOut">
               <a:rPr lang="en-US" smtClean="0"/>
-              <a:t>8/31/22</a:t>
+              <a:t>9/1/22</a:t>
             </a:fld>
             <a:endParaRPr lang="en-US"/>
           </a:p>
@@ -761,7 +766,7 @@
           <a:p>
             <a:fld id="{5B3499D5-C268-0F49-9415-6FD9F1032B06}" type="datetimeFigureOut">
               <a:rPr lang="en-US" smtClean="0"/>
-              <a:t>8/31/22</a:t>
+              <a:t>9/1/22</a:t>
             </a:fld>
             <a:endParaRPr lang="en-US"/>
           </a:p>
@@ -1005,7 +1010,7 @@
           <a:p>
             <a:fld id="{5B3499D5-C268-0F49-9415-6FD9F1032B06}" type="datetimeFigureOut">
               <a:rPr lang="en-US" smtClean="0"/>
-              <a:t>8/31/22</a:t>
+              <a:t>9/1/22</a:t>
             </a:fld>
             <a:endParaRPr lang="en-US"/>
           </a:p>
@@ -1237,7 +1242,7 @@
           <a:p>
             <a:fld id="{5B3499D5-C268-0F49-9415-6FD9F1032B06}" type="datetimeFigureOut">
               <a:rPr lang="en-US" smtClean="0"/>
-              <a:t>8/31/22</a:t>
+              <a:t>9/1/22</a:t>
             </a:fld>
             <a:endParaRPr lang="en-US"/>
           </a:p>
@@ -1604,7 +1609,7 @@
           <a:p>
             <a:fld id="{5B3499D5-C268-0F49-9415-6FD9F1032B06}" type="datetimeFigureOut">
               <a:rPr lang="en-US" smtClean="0"/>
-              <a:t>8/31/22</a:t>
+              <a:t>9/1/22</a:t>
             </a:fld>
             <a:endParaRPr lang="en-US"/>
           </a:p>
@@ -1722,7 +1727,7 @@
           <a:p>
             <a:fld id="{5B3499D5-C268-0F49-9415-6FD9F1032B06}" type="datetimeFigureOut">
               <a:rPr lang="en-US" smtClean="0"/>
-              <a:t>8/31/22</a:t>
+              <a:t>9/1/22</a:t>
             </a:fld>
             <a:endParaRPr lang="en-US"/>
           </a:p>
@@ -1817,7 +1822,7 @@
           <a:p>
             <a:fld id="{5B3499D5-C268-0F49-9415-6FD9F1032B06}" type="datetimeFigureOut">
               <a:rPr lang="en-US" smtClean="0"/>
-              <a:t>8/31/22</a:t>
+              <a:t>9/1/22</a:t>
             </a:fld>
             <a:endParaRPr lang="en-US"/>
           </a:p>
@@ -2094,7 +2099,7 @@
           <a:p>
             <a:fld id="{5B3499D5-C268-0F49-9415-6FD9F1032B06}" type="datetimeFigureOut">
               <a:rPr lang="en-US" smtClean="0"/>
-              <a:t>8/31/22</a:t>
+              <a:t>9/1/22</a:t>
             </a:fld>
             <a:endParaRPr lang="en-US"/>
           </a:p>
@@ -2351,7 +2356,7 @@
           <a:p>
             <a:fld id="{5B3499D5-C268-0F49-9415-6FD9F1032B06}" type="datetimeFigureOut">
               <a:rPr lang="en-US" smtClean="0"/>
-              <a:t>8/31/22</a:t>
+              <a:t>9/1/22</a:t>
             </a:fld>
             <a:endParaRPr lang="en-US"/>
           </a:p>
@@ -2564,7 +2569,7 @@
           <a:p>
             <a:fld id="{5B3499D5-C268-0F49-9415-6FD9F1032B06}" type="datetimeFigureOut">
               <a:rPr lang="en-US" smtClean="0"/>
-              <a:t>8/31/22</a:t>
+              <a:t>9/1/22</a:t>
             </a:fld>
             <a:endParaRPr lang="en-US"/>
           </a:p>
@@ -2971,7 +2976,7 @@
       </p:grpSpPr>
       <p:sp>
         <p:nvSpPr>
-          <p:cNvPr id="4" name="Rounded Rectangle 3">
+          <p:cNvPr id="4" name="Parallelogram 3">
             <a:extLst>
               <a:ext uri="{FF2B5EF4-FFF2-40B4-BE49-F238E27FC236}">
                 <a16:creationId xmlns:a16="http://schemas.microsoft.com/office/drawing/2014/main" id="{4A1744E8-47E8-664B-A27D-9198AEB50B52}"/>
@@ -2986,7 +2991,7 @@
             <a:off x="167082" y="107304"/>
             <a:ext cx="1271620" cy="331916"/>
           </a:xfrm>
-          <a:prstGeom prst="roundRect">
+          <a:prstGeom prst="parallelogram">
             <a:avLst/>
           </a:prstGeom>
           <a:solidFill>
@@ -3021,7 +3026,7 @@
           <a:p>
             <a:pPr algn="ctr"/>
             <a:r>
-              <a:rPr lang="en-US" dirty="0">
+              <a:rPr lang="en-US" sz="1600" dirty="0">
                 <a:solidFill>
                   <a:sysClr val="windowText" lastClr="000000"/>
                 </a:solidFill>
@@ -3033,7 +3038,7 @@
       </p:sp>
       <p:sp>
         <p:nvSpPr>
-          <p:cNvPr id="48" name="Rounded Rectangle 47">
+          <p:cNvPr id="48" name="Parallelogram 47">
             <a:extLst>
               <a:ext uri="{FF2B5EF4-FFF2-40B4-BE49-F238E27FC236}">
                 <a16:creationId xmlns:a16="http://schemas.microsoft.com/office/drawing/2014/main" id="{EDC0A576-FE6A-C147-8732-9E877263B7A4}"/>
@@ -3048,7 +3053,7 @@
             <a:off x="1761698" y="107304"/>
             <a:ext cx="1271620" cy="331916"/>
           </a:xfrm>
-          <a:prstGeom prst="roundRect">
+          <a:prstGeom prst="parallelogram">
             <a:avLst/>
           </a:prstGeom>
           <a:solidFill>
@@ -3083,7 +3088,7 @@
           <a:p>
             <a:pPr algn="ctr"/>
             <a:r>
-              <a:rPr lang="en-US" dirty="0">
+              <a:rPr lang="en-US" sz="1600" dirty="0">
                 <a:solidFill>
                   <a:sysClr val="windowText" lastClr="000000"/>
                 </a:solidFill>
@@ -3467,7 +3472,7 @@
       </p:sp>
       <p:sp>
         <p:nvSpPr>
-          <p:cNvPr id="59" name="Rounded Rectangle 58">
+          <p:cNvPr id="59" name="Parallelogram 58">
             <a:extLst>
               <a:ext uri="{FF2B5EF4-FFF2-40B4-BE49-F238E27FC236}">
                 <a16:creationId xmlns:a16="http://schemas.microsoft.com/office/drawing/2014/main" id="{08C082B5-3251-5B47-86BE-825145EE1CDC}"/>
@@ -3482,7 +3487,7 @@
             <a:off x="167082" y="3163998"/>
             <a:ext cx="1271620" cy="331916"/>
           </a:xfrm>
-          <a:prstGeom prst="roundRect">
+          <a:prstGeom prst="parallelogram">
             <a:avLst/>
           </a:prstGeom>
           <a:solidFill>
@@ -3517,7 +3522,7 @@
           <a:p>
             <a:pPr algn="ctr"/>
             <a:r>
-              <a:rPr lang="en-US" dirty="0">
+              <a:rPr lang="en-US" sz="1400" dirty="0">
                 <a:solidFill>
                   <a:sysClr val="windowText" lastClr="000000"/>
                 </a:solidFill>
@@ -3529,7 +3534,7 @@
       </p:sp>
       <p:sp>
         <p:nvSpPr>
-          <p:cNvPr id="60" name="Rounded Rectangle 59">
+          <p:cNvPr id="60" name="Parallelogram 59">
             <a:extLst>
               <a:ext uri="{FF2B5EF4-FFF2-40B4-BE49-F238E27FC236}">
                 <a16:creationId xmlns:a16="http://schemas.microsoft.com/office/drawing/2014/main" id="{23F2FCB8-C80C-EE4E-A12C-F04B453BAD31}"/>
@@ -3544,7 +3549,7 @@
             <a:off x="1761698" y="3163998"/>
             <a:ext cx="1271620" cy="331916"/>
           </a:xfrm>
-          <a:prstGeom prst="roundRect">
+          <a:prstGeom prst="parallelogram">
             <a:avLst/>
           </a:prstGeom>
           <a:solidFill>
@@ -3579,7 +3584,7 @@
           <a:p>
             <a:pPr algn="ctr"/>
             <a:r>
-              <a:rPr lang="en-US" dirty="0">
+              <a:rPr lang="en-US" sz="1600" dirty="0">
                 <a:solidFill>
                   <a:sysClr val="windowText" lastClr="000000"/>
                 </a:solidFill>
@@ -3599,7 +3604,6 @@
             </a:extLst>
           </p:cNvPr>
           <p:cNvCxnSpPr>
-            <a:stCxn id="4" idx="2"/>
             <a:endCxn id="49" idx="0"/>
           </p:cNvCxnSpPr>
           <p:nvPr/>
@@ -3642,7 +3646,6 @@
           </p:cNvPr>
           <p:cNvCxnSpPr>
             <a:cxnSpLocks/>
-            <a:stCxn id="4" idx="2"/>
             <a:endCxn id="50" idx="0"/>
           </p:cNvCxnSpPr>
           <p:nvPr/>
@@ -3685,7 +3688,6 @@
           </p:cNvPr>
           <p:cNvCxnSpPr>
             <a:cxnSpLocks/>
-            <a:stCxn id="48" idx="2"/>
             <a:endCxn id="49" idx="0"/>
           </p:cNvCxnSpPr>
           <p:nvPr/>
@@ -3728,7 +3730,6 @@
           </p:cNvPr>
           <p:cNvCxnSpPr>
             <a:cxnSpLocks/>
-            <a:stCxn id="48" idx="2"/>
             <a:endCxn id="50" idx="0"/>
           </p:cNvCxnSpPr>
           <p:nvPr/>
@@ -4229,6 +4230,230 @@
           </a:prstGeom>
           <a:ln w="12700">
             <a:tailEnd type="triangle"/>
+          </a:ln>
+        </p:spPr>
+        <p:style>
+          <a:lnRef idx="1">
+            <a:schemeClr val="accent1"/>
+          </a:lnRef>
+          <a:fillRef idx="0">
+            <a:schemeClr val="accent1"/>
+          </a:fillRef>
+          <a:effectRef idx="0">
+            <a:schemeClr val="accent1"/>
+          </a:effectRef>
+          <a:fontRef idx="minor">
+            <a:schemeClr val="tx1"/>
+          </a:fontRef>
+        </p:style>
+      </p:cxnSp>
+      <p:cxnSp>
+        <p:nvCxnSpPr>
+          <p:cNvPr id="5" name="Straight Connector 4">
+            <a:extLst>
+              <a:ext uri="{FF2B5EF4-FFF2-40B4-BE49-F238E27FC236}">
+                <a16:creationId xmlns:a16="http://schemas.microsoft.com/office/drawing/2014/main" id="{E010CF8F-D733-AB41-A717-5FC01AF4FEDB}"/>
+              </a:ext>
+            </a:extLst>
+          </p:cNvPr>
+          <p:cNvCxnSpPr>
+            <a:stCxn id="4" idx="2"/>
+            <a:endCxn id="48" idx="5"/>
+          </p:cNvCxnSpPr>
+          <p:nvPr/>
+        </p:nvCxnSpPr>
+        <p:spPr>
+          <a:xfrm>
+            <a:off x="1397213" y="273262"/>
+            <a:ext cx="405975" cy="0"/>
+          </a:xfrm>
+          <a:prstGeom prst="line">
+            <a:avLst/>
+          </a:prstGeom>
+          <a:ln w="12700">
+            <a:solidFill>
+              <a:srgbClr val="FF0000"/>
+            </a:solidFill>
+          </a:ln>
+        </p:spPr>
+        <p:style>
+          <a:lnRef idx="1">
+            <a:schemeClr val="accent1"/>
+          </a:lnRef>
+          <a:fillRef idx="0">
+            <a:schemeClr val="accent1"/>
+          </a:fillRef>
+          <a:effectRef idx="0">
+            <a:schemeClr val="accent1"/>
+          </a:effectRef>
+          <a:fontRef idx="minor">
+            <a:schemeClr val="tx1"/>
+          </a:fontRef>
+        </p:style>
+      </p:cxnSp>
+      <p:cxnSp>
+        <p:nvCxnSpPr>
+          <p:cNvPr id="31" name="Straight Connector 30">
+            <a:extLst>
+              <a:ext uri="{FF2B5EF4-FFF2-40B4-BE49-F238E27FC236}">
+                <a16:creationId xmlns:a16="http://schemas.microsoft.com/office/drawing/2014/main" id="{0440145C-BF81-944E-86EA-DB7ACF058D01}"/>
+              </a:ext>
+            </a:extLst>
+          </p:cNvPr>
+          <p:cNvCxnSpPr>
+            <a:cxnSpLocks/>
+            <a:stCxn id="49" idx="3"/>
+            <a:endCxn id="50" idx="1"/>
+          </p:cNvCxnSpPr>
+          <p:nvPr/>
+        </p:nvCxnSpPr>
+        <p:spPr>
+          <a:xfrm>
+            <a:off x="1438702" y="1040804"/>
+            <a:ext cx="322996" cy="0"/>
+          </a:xfrm>
+          <a:prstGeom prst="line">
+            <a:avLst/>
+          </a:prstGeom>
+          <a:ln w="12700">
+            <a:solidFill>
+              <a:srgbClr val="FF0000"/>
+            </a:solidFill>
+          </a:ln>
+        </p:spPr>
+        <p:style>
+          <a:lnRef idx="1">
+            <a:schemeClr val="accent1"/>
+          </a:lnRef>
+          <a:fillRef idx="0">
+            <a:schemeClr val="accent1"/>
+          </a:fillRef>
+          <a:effectRef idx="0">
+            <a:schemeClr val="accent1"/>
+          </a:effectRef>
+          <a:fontRef idx="minor">
+            <a:schemeClr val="tx1"/>
+          </a:fontRef>
+        </p:style>
+      </p:cxnSp>
+      <p:cxnSp>
+        <p:nvCxnSpPr>
+          <p:cNvPr id="34" name="Straight Connector 33">
+            <a:extLst>
+              <a:ext uri="{FF2B5EF4-FFF2-40B4-BE49-F238E27FC236}">
+                <a16:creationId xmlns:a16="http://schemas.microsoft.com/office/drawing/2014/main" id="{7D4A4D30-CB5C-574D-BFF0-92404A10BCC1}"/>
+              </a:ext>
+            </a:extLst>
+          </p:cNvPr>
+          <p:cNvCxnSpPr>
+            <a:cxnSpLocks/>
+            <a:stCxn id="53" idx="3"/>
+            <a:endCxn id="54" idx="1"/>
+          </p:cNvCxnSpPr>
+          <p:nvPr/>
+        </p:nvCxnSpPr>
+        <p:spPr>
+          <a:xfrm>
+            <a:off x="1438702" y="1808346"/>
+            <a:ext cx="322996" cy="0"/>
+          </a:xfrm>
+          <a:prstGeom prst="line">
+            <a:avLst/>
+          </a:prstGeom>
+          <a:ln w="12700">
+            <a:solidFill>
+              <a:srgbClr val="FF0000"/>
+            </a:solidFill>
+          </a:ln>
+        </p:spPr>
+        <p:style>
+          <a:lnRef idx="1">
+            <a:schemeClr val="accent1"/>
+          </a:lnRef>
+          <a:fillRef idx="0">
+            <a:schemeClr val="accent1"/>
+          </a:fillRef>
+          <a:effectRef idx="0">
+            <a:schemeClr val="accent1"/>
+          </a:effectRef>
+          <a:fontRef idx="minor">
+            <a:schemeClr val="tx1"/>
+          </a:fontRef>
+        </p:style>
+      </p:cxnSp>
+      <p:cxnSp>
+        <p:nvCxnSpPr>
+          <p:cNvPr id="37" name="Straight Connector 36">
+            <a:extLst>
+              <a:ext uri="{FF2B5EF4-FFF2-40B4-BE49-F238E27FC236}">
+                <a16:creationId xmlns:a16="http://schemas.microsoft.com/office/drawing/2014/main" id="{3155B6E5-1D66-E548-8367-DE558338C0CA}"/>
+              </a:ext>
+            </a:extLst>
+          </p:cNvPr>
+          <p:cNvCxnSpPr>
+            <a:cxnSpLocks/>
+            <a:stCxn id="57" idx="3"/>
+            <a:endCxn id="58" idx="1"/>
+          </p:cNvCxnSpPr>
+          <p:nvPr/>
+        </p:nvCxnSpPr>
+        <p:spPr>
+          <a:xfrm>
+            <a:off x="1438702" y="2575888"/>
+            <a:ext cx="322996" cy="0"/>
+          </a:xfrm>
+          <a:prstGeom prst="line">
+            <a:avLst/>
+          </a:prstGeom>
+          <a:ln w="12700">
+            <a:solidFill>
+              <a:srgbClr val="FF0000"/>
+            </a:solidFill>
+          </a:ln>
+        </p:spPr>
+        <p:style>
+          <a:lnRef idx="1">
+            <a:schemeClr val="accent1"/>
+          </a:lnRef>
+          <a:fillRef idx="0">
+            <a:schemeClr val="accent1"/>
+          </a:fillRef>
+          <a:effectRef idx="0">
+            <a:schemeClr val="accent1"/>
+          </a:effectRef>
+          <a:fontRef idx="minor">
+            <a:schemeClr val="tx1"/>
+          </a:fontRef>
+        </p:style>
+      </p:cxnSp>
+      <p:cxnSp>
+        <p:nvCxnSpPr>
+          <p:cNvPr id="40" name="Straight Connector 39">
+            <a:extLst>
+              <a:ext uri="{FF2B5EF4-FFF2-40B4-BE49-F238E27FC236}">
+                <a16:creationId xmlns:a16="http://schemas.microsoft.com/office/drawing/2014/main" id="{2C50B67A-FFEC-0440-93F0-EB1ADABE36CB}"/>
+              </a:ext>
+            </a:extLst>
+          </p:cNvPr>
+          <p:cNvCxnSpPr>
+            <a:cxnSpLocks/>
+            <a:stCxn id="59" idx="2"/>
+            <a:endCxn id="60" idx="5"/>
+          </p:cNvCxnSpPr>
+          <p:nvPr/>
+        </p:nvCxnSpPr>
+        <p:spPr>
+          <a:xfrm>
+            <a:off x="1397213" y="3329956"/>
+            <a:ext cx="405975" cy="0"/>
+          </a:xfrm>
+          <a:prstGeom prst="line">
+            <a:avLst/>
+          </a:prstGeom>
+          <a:ln w="12700">
+            <a:solidFill>
+              <a:srgbClr val="FF0000"/>
+            </a:solidFill>
           </a:ln>
         </p:spPr>
         <p:style>
@@ -4770,7 +4995,7 @@
       </p:grpSpPr>
       <p:sp>
         <p:nvSpPr>
-          <p:cNvPr id="4" name="Rounded Rectangle 3">
+          <p:cNvPr id="4" name="Parallelogram 3">
             <a:extLst>
               <a:ext uri="{FF2B5EF4-FFF2-40B4-BE49-F238E27FC236}">
                 <a16:creationId xmlns:a16="http://schemas.microsoft.com/office/drawing/2014/main" id="{4A1744E8-47E8-664B-A27D-9198AEB50B52}"/>
@@ -4785,7 +5010,7 @@
             <a:off x="167082" y="107304"/>
             <a:ext cx="1271620" cy="331916"/>
           </a:xfrm>
-          <a:prstGeom prst="roundRect">
+          <a:prstGeom prst="parallelogram">
             <a:avLst/>
           </a:prstGeom>
           <a:solidFill>
@@ -4820,7 +5045,7 @@
           <a:p>
             <a:pPr algn="ctr"/>
             <a:r>
-              <a:rPr lang="en-US" dirty="0">
+              <a:rPr lang="en-US" sz="1600" dirty="0">
                 <a:solidFill>
                   <a:sysClr val="windowText" lastClr="000000"/>
                 </a:solidFill>
@@ -4832,7 +5057,7 @@
       </p:sp>
       <p:sp>
         <p:nvSpPr>
-          <p:cNvPr id="48" name="Rounded Rectangle 47">
+          <p:cNvPr id="48" name="Parallelogram 47">
             <a:extLst>
               <a:ext uri="{FF2B5EF4-FFF2-40B4-BE49-F238E27FC236}">
                 <a16:creationId xmlns:a16="http://schemas.microsoft.com/office/drawing/2014/main" id="{EDC0A576-FE6A-C147-8732-9E877263B7A4}"/>
@@ -4847,7 +5072,7 @@
             <a:off x="1761698" y="107304"/>
             <a:ext cx="1271620" cy="331916"/>
           </a:xfrm>
-          <a:prstGeom prst="roundRect">
+          <a:prstGeom prst="parallelogram">
             <a:avLst/>
           </a:prstGeom>
           <a:solidFill>
@@ -4882,7 +5107,7 @@
           <a:p>
             <a:pPr algn="ctr"/>
             <a:r>
-              <a:rPr lang="en-US" dirty="0">
+              <a:rPr lang="en-US" sz="1600" dirty="0">
                 <a:solidFill>
                   <a:sysClr val="windowText" lastClr="000000"/>
                 </a:solidFill>
@@ -5042,8 +5267,10 @@
               <a:lumOff val="60000"/>
             </a:schemeClr>
           </a:solidFill>
-          <a:ln>
-            <a:noFill/>
+          <a:ln w="38100">
+            <a:solidFill>
+              <a:schemeClr val="accent6"/>
+            </a:solidFill>
           </a:ln>
         </p:spPr>
         <p:style>
@@ -5266,7 +5493,7 @@
       </p:sp>
       <p:sp>
         <p:nvSpPr>
-          <p:cNvPr id="59" name="Rounded Rectangle 58">
+          <p:cNvPr id="59" name="Parallelogram 58">
             <a:extLst>
               <a:ext uri="{FF2B5EF4-FFF2-40B4-BE49-F238E27FC236}">
                 <a16:creationId xmlns:a16="http://schemas.microsoft.com/office/drawing/2014/main" id="{08C082B5-3251-5B47-86BE-825145EE1CDC}"/>
@@ -5281,7 +5508,7 @@
             <a:off x="167082" y="3163998"/>
             <a:ext cx="1271620" cy="331916"/>
           </a:xfrm>
-          <a:prstGeom prst="roundRect">
+          <a:prstGeom prst="parallelogram">
             <a:avLst/>
           </a:prstGeom>
           <a:solidFill>
@@ -5316,7 +5543,7 @@
           <a:p>
             <a:pPr algn="ctr"/>
             <a:r>
-              <a:rPr lang="en-US" dirty="0">
+              <a:rPr lang="en-US" sz="1400" dirty="0">
                 <a:solidFill>
                   <a:sysClr val="windowText" lastClr="000000"/>
                 </a:solidFill>
@@ -5328,7 +5555,7 @@
       </p:sp>
       <p:sp>
         <p:nvSpPr>
-          <p:cNvPr id="60" name="Rounded Rectangle 59">
+          <p:cNvPr id="60" name="Parallelogram 59">
             <a:extLst>
               <a:ext uri="{FF2B5EF4-FFF2-40B4-BE49-F238E27FC236}">
                 <a16:creationId xmlns:a16="http://schemas.microsoft.com/office/drawing/2014/main" id="{23F2FCB8-C80C-EE4E-A12C-F04B453BAD31}"/>
@@ -5343,7 +5570,7 @@
             <a:off x="1761698" y="3163998"/>
             <a:ext cx="1271620" cy="331916"/>
           </a:xfrm>
-          <a:prstGeom prst="roundRect">
+          <a:prstGeom prst="parallelogram">
             <a:avLst/>
           </a:prstGeom>
           <a:solidFill>
@@ -5378,7 +5605,7 @@
           <a:p>
             <a:pPr algn="ctr"/>
             <a:r>
-              <a:rPr lang="en-US" dirty="0">
+              <a:rPr lang="en-US" sz="1600" dirty="0">
                 <a:solidFill>
                   <a:sysClr val="windowText" lastClr="000000"/>
                 </a:solidFill>
@@ -5398,7 +5625,6 @@
             </a:extLst>
           </p:cNvPr>
           <p:cNvCxnSpPr>
-            <a:stCxn id="4" idx="2"/>
             <a:endCxn id="49" idx="0"/>
           </p:cNvCxnSpPr>
           <p:nvPr/>
@@ -5441,7 +5667,6 @@
           </p:cNvPr>
           <p:cNvCxnSpPr>
             <a:cxnSpLocks/>
-            <a:stCxn id="4" idx="2"/>
             <a:endCxn id="50" idx="0"/>
           </p:cNvCxnSpPr>
           <p:nvPr/>
@@ -5484,7 +5709,6 @@
           </p:cNvPr>
           <p:cNvCxnSpPr>
             <a:cxnSpLocks/>
-            <a:stCxn id="48" idx="2"/>
             <a:endCxn id="49" idx="0"/>
           </p:cNvCxnSpPr>
           <p:nvPr/>
@@ -5527,7 +5751,6 @@
           </p:cNvPr>
           <p:cNvCxnSpPr>
             <a:cxnSpLocks/>
-            <a:stCxn id="48" idx="2"/>
             <a:endCxn id="50" idx="0"/>
           </p:cNvCxnSpPr>
           <p:nvPr/>
@@ -5881,10 +6104,234 @@
           </a:fontRef>
         </p:style>
       </p:cxnSp>
+      <p:cxnSp>
+        <p:nvCxnSpPr>
+          <p:cNvPr id="5" name="Straight Connector 4">
+            <a:extLst>
+              <a:ext uri="{FF2B5EF4-FFF2-40B4-BE49-F238E27FC236}">
+                <a16:creationId xmlns:a16="http://schemas.microsoft.com/office/drawing/2014/main" id="{E010CF8F-D733-AB41-A717-5FC01AF4FEDB}"/>
+              </a:ext>
+            </a:extLst>
+          </p:cNvPr>
+          <p:cNvCxnSpPr>
+            <a:stCxn id="4" idx="2"/>
+            <a:endCxn id="48" idx="5"/>
+          </p:cNvCxnSpPr>
+          <p:nvPr/>
+        </p:nvCxnSpPr>
+        <p:spPr>
+          <a:xfrm>
+            <a:off x="1397213" y="273262"/>
+            <a:ext cx="405975" cy="0"/>
+          </a:xfrm>
+          <a:prstGeom prst="line">
+            <a:avLst/>
+          </a:prstGeom>
+          <a:ln w="12700">
+            <a:solidFill>
+              <a:srgbClr val="FF0000"/>
+            </a:solidFill>
+          </a:ln>
+        </p:spPr>
+        <p:style>
+          <a:lnRef idx="1">
+            <a:schemeClr val="accent1"/>
+          </a:lnRef>
+          <a:fillRef idx="0">
+            <a:schemeClr val="accent1"/>
+          </a:fillRef>
+          <a:effectRef idx="0">
+            <a:schemeClr val="accent1"/>
+          </a:effectRef>
+          <a:fontRef idx="minor">
+            <a:schemeClr val="tx1"/>
+          </a:fontRef>
+        </p:style>
+      </p:cxnSp>
+      <p:cxnSp>
+        <p:nvCxnSpPr>
+          <p:cNvPr id="31" name="Straight Connector 30">
+            <a:extLst>
+              <a:ext uri="{FF2B5EF4-FFF2-40B4-BE49-F238E27FC236}">
+                <a16:creationId xmlns:a16="http://schemas.microsoft.com/office/drawing/2014/main" id="{0440145C-BF81-944E-86EA-DB7ACF058D01}"/>
+              </a:ext>
+            </a:extLst>
+          </p:cNvPr>
+          <p:cNvCxnSpPr>
+            <a:cxnSpLocks/>
+            <a:stCxn id="49" idx="3"/>
+            <a:endCxn id="50" idx="1"/>
+          </p:cNvCxnSpPr>
+          <p:nvPr/>
+        </p:nvCxnSpPr>
+        <p:spPr>
+          <a:xfrm>
+            <a:off x="1438702" y="1040804"/>
+            <a:ext cx="322996" cy="0"/>
+          </a:xfrm>
+          <a:prstGeom prst="line">
+            <a:avLst/>
+          </a:prstGeom>
+          <a:ln w="12700">
+            <a:solidFill>
+              <a:srgbClr val="FF0000"/>
+            </a:solidFill>
+          </a:ln>
+        </p:spPr>
+        <p:style>
+          <a:lnRef idx="1">
+            <a:schemeClr val="accent1"/>
+          </a:lnRef>
+          <a:fillRef idx="0">
+            <a:schemeClr val="accent1"/>
+          </a:fillRef>
+          <a:effectRef idx="0">
+            <a:schemeClr val="accent1"/>
+          </a:effectRef>
+          <a:fontRef idx="minor">
+            <a:schemeClr val="tx1"/>
+          </a:fontRef>
+        </p:style>
+      </p:cxnSp>
+      <p:cxnSp>
+        <p:nvCxnSpPr>
+          <p:cNvPr id="34" name="Straight Connector 33">
+            <a:extLst>
+              <a:ext uri="{FF2B5EF4-FFF2-40B4-BE49-F238E27FC236}">
+                <a16:creationId xmlns:a16="http://schemas.microsoft.com/office/drawing/2014/main" id="{7D4A4D30-CB5C-574D-BFF0-92404A10BCC1}"/>
+              </a:ext>
+            </a:extLst>
+          </p:cNvPr>
+          <p:cNvCxnSpPr>
+            <a:cxnSpLocks/>
+            <a:stCxn id="53" idx="3"/>
+            <a:endCxn id="54" idx="1"/>
+          </p:cNvCxnSpPr>
+          <p:nvPr/>
+        </p:nvCxnSpPr>
+        <p:spPr>
+          <a:xfrm>
+            <a:off x="1438702" y="1808346"/>
+            <a:ext cx="322996" cy="0"/>
+          </a:xfrm>
+          <a:prstGeom prst="line">
+            <a:avLst/>
+          </a:prstGeom>
+          <a:ln w="12700">
+            <a:solidFill>
+              <a:srgbClr val="FF0000"/>
+            </a:solidFill>
+          </a:ln>
+        </p:spPr>
+        <p:style>
+          <a:lnRef idx="1">
+            <a:schemeClr val="accent1"/>
+          </a:lnRef>
+          <a:fillRef idx="0">
+            <a:schemeClr val="accent1"/>
+          </a:fillRef>
+          <a:effectRef idx="0">
+            <a:schemeClr val="accent1"/>
+          </a:effectRef>
+          <a:fontRef idx="minor">
+            <a:schemeClr val="tx1"/>
+          </a:fontRef>
+        </p:style>
+      </p:cxnSp>
+      <p:cxnSp>
+        <p:nvCxnSpPr>
+          <p:cNvPr id="37" name="Straight Connector 36">
+            <a:extLst>
+              <a:ext uri="{FF2B5EF4-FFF2-40B4-BE49-F238E27FC236}">
+                <a16:creationId xmlns:a16="http://schemas.microsoft.com/office/drawing/2014/main" id="{3155B6E5-1D66-E548-8367-DE558338C0CA}"/>
+              </a:ext>
+            </a:extLst>
+          </p:cNvPr>
+          <p:cNvCxnSpPr>
+            <a:cxnSpLocks/>
+            <a:stCxn id="57" idx="3"/>
+            <a:endCxn id="58" idx="1"/>
+          </p:cNvCxnSpPr>
+          <p:nvPr/>
+        </p:nvCxnSpPr>
+        <p:spPr>
+          <a:xfrm>
+            <a:off x="1438702" y="2575888"/>
+            <a:ext cx="322996" cy="0"/>
+          </a:xfrm>
+          <a:prstGeom prst="line">
+            <a:avLst/>
+          </a:prstGeom>
+          <a:ln w="12700">
+            <a:solidFill>
+              <a:srgbClr val="FF0000"/>
+            </a:solidFill>
+          </a:ln>
+        </p:spPr>
+        <p:style>
+          <a:lnRef idx="1">
+            <a:schemeClr val="accent1"/>
+          </a:lnRef>
+          <a:fillRef idx="0">
+            <a:schemeClr val="accent1"/>
+          </a:fillRef>
+          <a:effectRef idx="0">
+            <a:schemeClr val="accent1"/>
+          </a:effectRef>
+          <a:fontRef idx="minor">
+            <a:schemeClr val="tx1"/>
+          </a:fontRef>
+        </p:style>
+      </p:cxnSp>
+      <p:cxnSp>
+        <p:nvCxnSpPr>
+          <p:cNvPr id="40" name="Straight Connector 39">
+            <a:extLst>
+              <a:ext uri="{FF2B5EF4-FFF2-40B4-BE49-F238E27FC236}">
+                <a16:creationId xmlns:a16="http://schemas.microsoft.com/office/drawing/2014/main" id="{2C50B67A-FFEC-0440-93F0-EB1ADABE36CB}"/>
+              </a:ext>
+            </a:extLst>
+          </p:cNvPr>
+          <p:cNvCxnSpPr>
+            <a:cxnSpLocks/>
+            <a:stCxn id="59" idx="2"/>
+            <a:endCxn id="60" idx="5"/>
+          </p:cNvCxnSpPr>
+          <p:nvPr/>
+        </p:nvCxnSpPr>
+        <p:spPr>
+          <a:xfrm>
+            <a:off x="1397213" y="3329956"/>
+            <a:ext cx="405975" cy="0"/>
+          </a:xfrm>
+          <a:prstGeom prst="line">
+            <a:avLst/>
+          </a:prstGeom>
+          <a:ln w="12700">
+            <a:solidFill>
+              <a:srgbClr val="FF0000"/>
+            </a:solidFill>
+          </a:ln>
+        </p:spPr>
+        <p:style>
+          <a:lnRef idx="1">
+            <a:schemeClr val="accent1"/>
+          </a:lnRef>
+          <a:fillRef idx="0">
+            <a:schemeClr val="accent1"/>
+          </a:fillRef>
+          <a:effectRef idx="0">
+            <a:schemeClr val="accent1"/>
+          </a:effectRef>
+          <a:fontRef idx="minor">
+            <a:schemeClr val="tx1"/>
+          </a:fontRef>
+        </p:style>
+      </p:cxnSp>
     </p:spTree>
     <p:extLst>
       <p:ext uri="{BB962C8B-B14F-4D97-AF65-F5344CB8AC3E}">
-        <p14:creationId xmlns:p14="http://schemas.microsoft.com/office/powerpoint/2010/main" val="1116105562"/>
+        <p14:creationId xmlns:p14="http://schemas.microsoft.com/office/powerpoint/2010/main" val="3889176183"/>
       </p:ext>
     </p:extLst>
   </p:cSld>
@@ -6405,7 +6852,7 @@
       </p:grpSpPr>
       <p:sp>
         <p:nvSpPr>
-          <p:cNvPr id="4" name="Rounded Rectangle 3">
+          <p:cNvPr id="4" name="Parallelogram 3">
             <a:extLst>
               <a:ext uri="{FF2B5EF4-FFF2-40B4-BE49-F238E27FC236}">
                 <a16:creationId xmlns:a16="http://schemas.microsoft.com/office/drawing/2014/main" id="{4A1744E8-47E8-664B-A27D-9198AEB50B52}"/>
@@ -6420,7 +6867,7 @@
             <a:off x="167082" y="107304"/>
             <a:ext cx="1271620" cy="331916"/>
           </a:xfrm>
-          <a:prstGeom prst="roundRect">
+          <a:prstGeom prst="parallelogram">
             <a:avLst/>
           </a:prstGeom>
           <a:solidFill>
@@ -6455,7 +6902,7 @@
           <a:p>
             <a:pPr algn="ctr"/>
             <a:r>
-              <a:rPr lang="en-US" dirty="0">
+              <a:rPr lang="en-US" sz="1600" dirty="0">
                 <a:solidFill>
                   <a:sysClr val="windowText" lastClr="000000"/>
                 </a:solidFill>
@@ -6467,7 +6914,7 @@
       </p:sp>
       <p:sp>
         <p:nvSpPr>
-          <p:cNvPr id="48" name="Rounded Rectangle 47">
+          <p:cNvPr id="48" name="Parallelogram 47">
             <a:extLst>
               <a:ext uri="{FF2B5EF4-FFF2-40B4-BE49-F238E27FC236}">
                 <a16:creationId xmlns:a16="http://schemas.microsoft.com/office/drawing/2014/main" id="{EDC0A576-FE6A-C147-8732-9E877263B7A4}"/>
@@ -6482,7 +6929,7 @@
             <a:off x="1761698" y="107304"/>
             <a:ext cx="1271620" cy="331916"/>
           </a:xfrm>
-          <a:prstGeom prst="roundRect">
+          <a:prstGeom prst="parallelogram">
             <a:avLst/>
           </a:prstGeom>
           <a:solidFill>
@@ -6517,7 +6964,7 @@
           <a:p>
             <a:pPr algn="ctr"/>
             <a:r>
-              <a:rPr lang="en-US" dirty="0">
+              <a:rPr lang="en-US" sz="1600" dirty="0">
                 <a:solidFill>
                   <a:sysClr val="windowText" lastClr="000000"/>
                 </a:solidFill>
@@ -6677,8 +7124,10 @@
               <a:lumOff val="60000"/>
             </a:schemeClr>
           </a:solidFill>
-          <a:ln>
-            <a:noFill/>
+          <a:ln w="38100">
+            <a:solidFill>
+              <a:schemeClr val="accent6"/>
+            </a:solidFill>
           </a:ln>
         </p:spPr>
         <p:style>
@@ -6863,8 +7312,10 @@
               <a:lumOff val="60000"/>
             </a:schemeClr>
           </a:solidFill>
-          <a:ln>
-            <a:noFill/>
+          <a:ln w="38100">
+            <a:solidFill>
+              <a:schemeClr val="accent6"/>
+            </a:solidFill>
           </a:ln>
         </p:spPr>
         <p:style>
@@ -6901,7 +7352,7 @@
       </p:sp>
       <p:sp>
         <p:nvSpPr>
-          <p:cNvPr id="59" name="Rounded Rectangle 58">
+          <p:cNvPr id="59" name="Parallelogram 58">
             <a:extLst>
               <a:ext uri="{FF2B5EF4-FFF2-40B4-BE49-F238E27FC236}">
                 <a16:creationId xmlns:a16="http://schemas.microsoft.com/office/drawing/2014/main" id="{08C082B5-3251-5B47-86BE-825145EE1CDC}"/>
@@ -6916,7 +7367,7 @@
             <a:off x="167082" y="3163998"/>
             <a:ext cx="1271620" cy="331916"/>
           </a:xfrm>
-          <a:prstGeom prst="roundRect">
+          <a:prstGeom prst="parallelogram">
             <a:avLst/>
           </a:prstGeom>
           <a:solidFill>
@@ -6951,7 +7402,7 @@
           <a:p>
             <a:pPr algn="ctr"/>
             <a:r>
-              <a:rPr lang="en-US" dirty="0">
+              <a:rPr lang="en-US" sz="1400" dirty="0">
                 <a:solidFill>
                   <a:sysClr val="windowText" lastClr="000000"/>
                 </a:solidFill>
@@ -6963,7 +7414,7 @@
       </p:sp>
       <p:sp>
         <p:nvSpPr>
-          <p:cNvPr id="60" name="Rounded Rectangle 59">
+          <p:cNvPr id="60" name="Parallelogram 59">
             <a:extLst>
               <a:ext uri="{FF2B5EF4-FFF2-40B4-BE49-F238E27FC236}">
                 <a16:creationId xmlns:a16="http://schemas.microsoft.com/office/drawing/2014/main" id="{23F2FCB8-C80C-EE4E-A12C-F04B453BAD31}"/>
@@ -6978,7 +7429,7 @@
             <a:off x="1761698" y="3163998"/>
             <a:ext cx="1271620" cy="331916"/>
           </a:xfrm>
-          <a:prstGeom prst="roundRect">
+          <a:prstGeom prst="parallelogram">
             <a:avLst/>
           </a:prstGeom>
           <a:solidFill>
@@ -7013,7 +7464,7 @@
           <a:p>
             <a:pPr algn="ctr"/>
             <a:r>
-              <a:rPr lang="en-US" dirty="0">
+              <a:rPr lang="en-US" sz="1600" dirty="0">
                 <a:solidFill>
                   <a:sysClr val="windowText" lastClr="000000"/>
                 </a:solidFill>
@@ -7033,7 +7484,6 @@
             </a:extLst>
           </p:cNvPr>
           <p:cNvCxnSpPr>
-            <a:stCxn id="4" idx="2"/>
             <a:endCxn id="49" idx="0"/>
           </p:cNvCxnSpPr>
           <p:nvPr/>
@@ -7076,7 +7526,6 @@
           </p:cNvPr>
           <p:cNvCxnSpPr>
             <a:cxnSpLocks/>
-            <a:stCxn id="4" idx="2"/>
             <a:endCxn id="50" idx="0"/>
           </p:cNvCxnSpPr>
           <p:nvPr/>
@@ -7119,7 +7568,6 @@
           </p:cNvPr>
           <p:cNvCxnSpPr>
             <a:cxnSpLocks/>
-            <a:stCxn id="48" idx="2"/>
             <a:endCxn id="49" idx="0"/>
           </p:cNvCxnSpPr>
           <p:nvPr/>
@@ -7162,7 +7610,6 @@
           </p:cNvPr>
           <p:cNvCxnSpPr>
             <a:cxnSpLocks/>
-            <a:stCxn id="48" idx="2"/>
             <a:endCxn id="50" idx="0"/>
           </p:cNvCxnSpPr>
           <p:nvPr/>
@@ -7397,10 +7844,234 @@
           </a:fontRef>
         </p:style>
       </p:cxnSp>
+      <p:cxnSp>
+        <p:nvCxnSpPr>
+          <p:cNvPr id="5" name="Straight Connector 4">
+            <a:extLst>
+              <a:ext uri="{FF2B5EF4-FFF2-40B4-BE49-F238E27FC236}">
+                <a16:creationId xmlns:a16="http://schemas.microsoft.com/office/drawing/2014/main" id="{E010CF8F-D733-AB41-A717-5FC01AF4FEDB}"/>
+              </a:ext>
+            </a:extLst>
+          </p:cNvPr>
+          <p:cNvCxnSpPr>
+            <a:stCxn id="4" idx="2"/>
+            <a:endCxn id="48" idx="5"/>
+          </p:cNvCxnSpPr>
+          <p:nvPr/>
+        </p:nvCxnSpPr>
+        <p:spPr>
+          <a:xfrm>
+            <a:off x="1397213" y="273262"/>
+            <a:ext cx="405975" cy="0"/>
+          </a:xfrm>
+          <a:prstGeom prst="line">
+            <a:avLst/>
+          </a:prstGeom>
+          <a:ln w="12700">
+            <a:solidFill>
+              <a:srgbClr val="FF0000"/>
+            </a:solidFill>
+          </a:ln>
+        </p:spPr>
+        <p:style>
+          <a:lnRef idx="1">
+            <a:schemeClr val="accent1"/>
+          </a:lnRef>
+          <a:fillRef idx="0">
+            <a:schemeClr val="accent1"/>
+          </a:fillRef>
+          <a:effectRef idx="0">
+            <a:schemeClr val="accent1"/>
+          </a:effectRef>
+          <a:fontRef idx="minor">
+            <a:schemeClr val="tx1"/>
+          </a:fontRef>
+        </p:style>
+      </p:cxnSp>
+      <p:cxnSp>
+        <p:nvCxnSpPr>
+          <p:cNvPr id="31" name="Straight Connector 30">
+            <a:extLst>
+              <a:ext uri="{FF2B5EF4-FFF2-40B4-BE49-F238E27FC236}">
+                <a16:creationId xmlns:a16="http://schemas.microsoft.com/office/drawing/2014/main" id="{0440145C-BF81-944E-86EA-DB7ACF058D01}"/>
+              </a:ext>
+            </a:extLst>
+          </p:cNvPr>
+          <p:cNvCxnSpPr>
+            <a:cxnSpLocks/>
+            <a:stCxn id="49" idx="3"/>
+            <a:endCxn id="50" idx="1"/>
+          </p:cNvCxnSpPr>
+          <p:nvPr/>
+        </p:nvCxnSpPr>
+        <p:spPr>
+          <a:xfrm>
+            <a:off x="1438702" y="1040804"/>
+            <a:ext cx="322996" cy="0"/>
+          </a:xfrm>
+          <a:prstGeom prst="line">
+            <a:avLst/>
+          </a:prstGeom>
+          <a:ln w="12700">
+            <a:solidFill>
+              <a:srgbClr val="FF0000"/>
+            </a:solidFill>
+          </a:ln>
+        </p:spPr>
+        <p:style>
+          <a:lnRef idx="1">
+            <a:schemeClr val="accent1"/>
+          </a:lnRef>
+          <a:fillRef idx="0">
+            <a:schemeClr val="accent1"/>
+          </a:fillRef>
+          <a:effectRef idx="0">
+            <a:schemeClr val="accent1"/>
+          </a:effectRef>
+          <a:fontRef idx="minor">
+            <a:schemeClr val="tx1"/>
+          </a:fontRef>
+        </p:style>
+      </p:cxnSp>
+      <p:cxnSp>
+        <p:nvCxnSpPr>
+          <p:cNvPr id="34" name="Straight Connector 33">
+            <a:extLst>
+              <a:ext uri="{FF2B5EF4-FFF2-40B4-BE49-F238E27FC236}">
+                <a16:creationId xmlns:a16="http://schemas.microsoft.com/office/drawing/2014/main" id="{7D4A4D30-CB5C-574D-BFF0-92404A10BCC1}"/>
+              </a:ext>
+            </a:extLst>
+          </p:cNvPr>
+          <p:cNvCxnSpPr>
+            <a:cxnSpLocks/>
+            <a:stCxn id="53" idx="3"/>
+            <a:endCxn id="54" idx="1"/>
+          </p:cNvCxnSpPr>
+          <p:nvPr/>
+        </p:nvCxnSpPr>
+        <p:spPr>
+          <a:xfrm>
+            <a:off x="1438702" y="1808346"/>
+            <a:ext cx="322996" cy="0"/>
+          </a:xfrm>
+          <a:prstGeom prst="line">
+            <a:avLst/>
+          </a:prstGeom>
+          <a:ln w="12700">
+            <a:solidFill>
+              <a:srgbClr val="FF0000"/>
+            </a:solidFill>
+          </a:ln>
+        </p:spPr>
+        <p:style>
+          <a:lnRef idx="1">
+            <a:schemeClr val="accent1"/>
+          </a:lnRef>
+          <a:fillRef idx="0">
+            <a:schemeClr val="accent1"/>
+          </a:fillRef>
+          <a:effectRef idx="0">
+            <a:schemeClr val="accent1"/>
+          </a:effectRef>
+          <a:fontRef idx="minor">
+            <a:schemeClr val="tx1"/>
+          </a:fontRef>
+        </p:style>
+      </p:cxnSp>
+      <p:cxnSp>
+        <p:nvCxnSpPr>
+          <p:cNvPr id="37" name="Straight Connector 36">
+            <a:extLst>
+              <a:ext uri="{FF2B5EF4-FFF2-40B4-BE49-F238E27FC236}">
+                <a16:creationId xmlns:a16="http://schemas.microsoft.com/office/drawing/2014/main" id="{3155B6E5-1D66-E548-8367-DE558338C0CA}"/>
+              </a:ext>
+            </a:extLst>
+          </p:cNvPr>
+          <p:cNvCxnSpPr>
+            <a:cxnSpLocks/>
+            <a:stCxn id="57" idx="3"/>
+            <a:endCxn id="58" idx="1"/>
+          </p:cNvCxnSpPr>
+          <p:nvPr/>
+        </p:nvCxnSpPr>
+        <p:spPr>
+          <a:xfrm>
+            <a:off x="1438702" y="2575888"/>
+            <a:ext cx="322996" cy="0"/>
+          </a:xfrm>
+          <a:prstGeom prst="line">
+            <a:avLst/>
+          </a:prstGeom>
+          <a:ln w="12700">
+            <a:solidFill>
+              <a:srgbClr val="FF0000"/>
+            </a:solidFill>
+          </a:ln>
+        </p:spPr>
+        <p:style>
+          <a:lnRef idx="1">
+            <a:schemeClr val="accent1"/>
+          </a:lnRef>
+          <a:fillRef idx="0">
+            <a:schemeClr val="accent1"/>
+          </a:fillRef>
+          <a:effectRef idx="0">
+            <a:schemeClr val="accent1"/>
+          </a:effectRef>
+          <a:fontRef idx="minor">
+            <a:schemeClr val="tx1"/>
+          </a:fontRef>
+        </p:style>
+      </p:cxnSp>
+      <p:cxnSp>
+        <p:nvCxnSpPr>
+          <p:cNvPr id="40" name="Straight Connector 39">
+            <a:extLst>
+              <a:ext uri="{FF2B5EF4-FFF2-40B4-BE49-F238E27FC236}">
+                <a16:creationId xmlns:a16="http://schemas.microsoft.com/office/drawing/2014/main" id="{2C50B67A-FFEC-0440-93F0-EB1ADABE36CB}"/>
+              </a:ext>
+            </a:extLst>
+          </p:cNvPr>
+          <p:cNvCxnSpPr>
+            <a:cxnSpLocks/>
+            <a:stCxn id="59" idx="2"/>
+            <a:endCxn id="60" idx="5"/>
+          </p:cNvCxnSpPr>
+          <p:nvPr/>
+        </p:nvCxnSpPr>
+        <p:spPr>
+          <a:xfrm>
+            <a:off x="1397213" y="3329956"/>
+            <a:ext cx="405975" cy="0"/>
+          </a:xfrm>
+          <a:prstGeom prst="line">
+            <a:avLst/>
+          </a:prstGeom>
+          <a:ln w="12700">
+            <a:solidFill>
+              <a:srgbClr val="FF0000"/>
+            </a:solidFill>
+          </a:ln>
+        </p:spPr>
+        <p:style>
+          <a:lnRef idx="1">
+            <a:schemeClr val="accent1"/>
+          </a:lnRef>
+          <a:fillRef idx="0">
+            <a:schemeClr val="accent1"/>
+          </a:fillRef>
+          <a:effectRef idx="0">
+            <a:schemeClr val="accent1"/>
+          </a:effectRef>
+          <a:fontRef idx="minor">
+            <a:schemeClr val="tx1"/>
+          </a:fontRef>
+        </p:style>
+      </p:cxnSp>
     </p:spTree>
     <p:extLst>
       <p:ext uri="{BB962C8B-B14F-4D97-AF65-F5344CB8AC3E}">
-        <p14:creationId xmlns:p14="http://schemas.microsoft.com/office/powerpoint/2010/main" val="4137609419"/>
+        <p14:creationId xmlns:p14="http://schemas.microsoft.com/office/powerpoint/2010/main" val="1831946209"/>
       </p:ext>
     </p:extLst>
   </p:cSld>
@@ -7921,7 +8592,7 @@
       </p:grpSpPr>
       <p:sp>
         <p:nvSpPr>
-          <p:cNvPr id="4" name="Rounded Rectangle 3">
+          <p:cNvPr id="4" name="Parallelogram 3">
             <a:extLst>
               <a:ext uri="{FF2B5EF4-FFF2-40B4-BE49-F238E27FC236}">
                 <a16:creationId xmlns:a16="http://schemas.microsoft.com/office/drawing/2014/main" id="{4A1744E8-47E8-664B-A27D-9198AEB50B52}"/>
@@ -7936,7 +8607,7 @@
             <a:off x="167082" y="107304"/>
             <a:ext cx="1271620" cy="331916"/>
           </a:xfrm>
-          <a:prstGeom prst="roundRect">
+          <a:prstGeom prst="parallelogram">
             <a:avLst/>
           </a:prstGeom>
           <a:solidFill>
@@ -7945,8 +8616,10 @@
               <a:lumOff val="60000"/>
             </a:schemeClr>
           </a:solidFill>
-          <a:ln>
-            <a:noFill/>
+          <a:ln w="38100">
+            <a:solidFill>
+              <a:schemeClr val="accent6"/>
+            </a:solidFill>
           </a:ln>
         </p:spPr>
         <p:style>
@@ -7971,7 +8644,7 @@
           <a:p>
             <a:pPr algn="ctr"/>
             <a:r>
-              <a:rPr lang="en-US" dirty="0">
+              <a:rPr lang="en-US" sz="1600" dirty="0">
                 <a:solidFill>
                   <a:sysClr val="windowText" lastClr="000000"/>
                 </a:solidFill>
@@ -7983,7 +8656,7 @@
       </p:sp>
       <p:sp>
         <p:nvSpPr>
-          <p:cNvPr id="48" name="Rounded Rectangle 47">
+          <p:cNvPr id="48" name="Parallelogram 47">
             <a:extLst>
               <a:ext uri="{FF2B5EF4-FFF2-40B4-BE49-F238E27FC236}">
                 <a16:creationId xmlns:a16="http://schemas.microsoft.com/office/drawing/2014/main" id="{EDC0A576-FE6A-C147-8732-9E877263B7A4}"/>
@@ -7998,7 +8671,7 @@
             <a:off x="1761698" y="107304"/>
             <a:ext cx="1271620" cy="331916"/>
           </a:xfrm>
-          <a:prstGeom prst="roundRect">
+          <a:prstGeom prst="parallelogram">
             <a:avLst/>
           </a:prstGeom>
           <a:solidFill>
@@ -8033,7 +8706,7 @@
           <a:p>
             <a:pPr algn="ctr"/>
             <a:r>
-              <a:rPr lang="en-US" dirty="0">
+              <a:rPr lang="en-US" sz="1600" dirty="0">
                 <a:solidFill>
                   <a:sysClr val="windowText" lastClr="000000"/>
                 </a:solidFill>
@@ -8193,8 +8866,10 @@
               <a:lumOff val="60000"/>
             </a:schemeClr>
           </a:solidFill>
-          <a:ln>
-            <a:noFill/>
+          <a:ln w="38100">
+            <a:solidFill>
+              <a:schemeClr val="accent6"/>
+            </a:solidFill>
           </a:ln>
         </p:spPr>
         <p:style>
@@ -8379,8 +9054,10 @@
               <a:lumOff val="60000"/>
             </a:schemeClr>
           </a:solidFill>
-          <a:ln>
-            <a:noFill/>
+          <a:ln w="38100">
+            <a:solidFill>
+              <a:schemeClr val="accent6"/>
+            </a:solidFill>
           </a:ln>
         </p:spPr>
         <p:style>
@@ -8417,7 +9094,7 @@
       </p:sp>
       <p:sp>
         <p:nvSpPr>
-          <p:cNvPr id="59" name="Rounded Rectangle 58">
+          <p:cNvPr id="59" name="Parallelogram 58">
             <a:extLst>
               <a:ext uri="{FF2B5EF4-FFF2-40B4-BE49-F238E27FC236}">
                 <a16:creationId xmlns:a16="http://schemas.microsoft.com/office/drawing/2014/main" id="{08C082B5-3251-5B47-86BE-825145EE1CDC}"/>
@@ -8432,7 +9109,7 @@
             <a:off x="167082" y="3163998"/>
             <a:ext cx="1271620" cy="331916"/>
           </a:xfrm>
-          <a:prstGeom prst="roundRect">
+          <a:prstGeom prst="parallelogram">
             <a:avLst/>
           </a:prstGeom>
           <a:solidFill>
@@ -8467,7 +9144,7 @@
           <a:p>
             <a:pPr algn="ctr"/>
             <a:r>
-              <a:rPr lang="en-US" dirty="0">
+              <a:rPr lang="en-US" sz="1400" dirty="0">
                 <a:solidFill>
                   <a:sysClr val="windowText" lastClr="000000"/>
                 </a:solidFill>
@@ -8479,7 +9156,7 @@
       </p:sp>
       <p:sp>
         <p:nvSpPr>
-          <p:cNvPr id="60" name="Rounded Rectangle 59">
+          <p:cNvPr id="60" name="Parallelogram 59">
             <a:extLst>
               <a:ext uri="{FF2B5EF4-FFF2-40B4-BE49-F238E27FC236}">
                 <a16:creationId xmlns:a16="http://schemas.microsoft.com/office/drawing/2014/main" id="{23F2FCB8-C80C-EE4E-A12C-F04B453BAD31}"/>
@@ -8494,7 +9171,7 @@
             <a:off x="1761698" y="3163998"/>
             <a:ext cx="1271620" cy="331916"/>
           </a:xfrm>
-          <a:prstGeom prst="roundRect">
+          <a:prstGeom prst="parallelogram">
             <a:avLst/>
           </a:prstGeom>
           <a:solidFill>
@@ -8529,7 +9206,7 @@
           <a:p>
             <a:pPr algn="ctr"/>
             <a:r>
-              <a:rPr lang="en-US" dirty="0">
+              <a:rPr lang="en-US" sz="1600" dirty="0">
                 <a:solidFill>
                   <a:sysClr val="windowText" lastClr="000000"/>
                 </a:solidFill>
@@ -8549,7 +9226,6 @@
             </a:extLst>
           </p:cNvPr>
           <p:cNvCxnSpPr>
-            <a:stCxn id="4" idx="2"/>
             <a:endCxn id="49" idx="0"/>
           </p:cNvCxnSpPr>
           <p:nvPr/>
@@ -8592,7 +9268,6 @@
           </p:cNvPr>
           <p:cNvCxnSpPr>
             <a:cxnSpLocks/>
-            <a:stCxn id="4" idx="2"/>
             <a:endCxn id="50" idx="0"/>
           </p:cNvCxnSpPr>
           <p:nvPr/>
@@ -8827,10 +9502,234 @@
           </a:fontRef>
         </p:style>
       </p:cxnSp>
+      <p:cxnSp>
+        <p:nvCxnSpPr>
+          <p:cNvPr id="5" name="Straight Connector 4">
+            <a:extLst>
+              <a:ext uri="{FF2B5EF4-FFF2-40B4-BE49-F238E27FC236}">
+                <a16:creationId xmlns:a16="http://schemas.microsoft.com/office/drawing/2014/main" id="{E010CF8F-D733-AB41-A717-5FC01AF4FEDB}"/>
+              </a:ext>
+            </a:extLst>
+          </p:cNvPr>
+          <p:cNvCxnSpPr>
+            <a:stCxn id="4" idx="2"/>
+            <a:endCxn id="48" idx="5"/>
+          </p:cNvCxnSpPr>
+          <p:nvPr/>
+        </p:nvCxnSpPr>
+        <p:spPr>
+          <a:xfrm>
+            <a:off x="1397213" y="273262"/>
+            <a:ext cx="405975" cy="0"/>
+          </a:xfrm>
+          <a:prstGeom prst="line">
+            <a:avLst/>
+          </a:prstGeom>
+          <a:ln w="12700">
+            <a:solidFill>
+              <a:srgbClr val="FF0000"/>
+            </a:solidFill>
+          </a:ln>
+        </p:spPr>
+        <p:style>
+          <a:lnRef idx="1">
+            <a:schemeClr val="accent1"/>
+          </a:lnRef>
+          <a:fillRef idx="0">
+            <a:schemeClr val="accent1"/>
+          </a:fillRef>
+          <a:effectRef idx="0">
+            <a:schemeClr val="accent1"/>
+          </a:effectRef>
+          <a:fontRef idx="minor">
+            <a:schemeClr val="tx1"/>
+          </a:fontRef>
+        </p:style>
+      </p:cxnSp>
+      <p:cxnSp>
+        <p:nvCxnSpPr>
+          <p:cNvPr id="31" name="Straight Connector 30">
+            <a:extLst>
+              <a:ext uri="{FF2B5EF4-FFF2-40B4-BE49-F238E27FC236}">
+                <a16:creationId xmlns:a16="http://schemas.microsoft.com/office/drawing/2014/main" id="{0440145C-BF81-944E-86EA-DB7ACF058D01}"/>
+              </a:ext>
+            </a:extLst>
+          </p:cNvPr>
+          <p:cNvCxnSpPr>
+            <a:cxnSpLocks/>
+            <a:stCxn id="49" idx="3"/>
+            <a:endCxn id="50" idx="1"/>
+          </p:cNvCxnSpPr>
+          <p:nvPr/>
+        </p:nvCxnSpPr>
+        <p:spPr>
+          <a:xfrm>
+            <a:off x="1438702" y="1040804"/>
+            <a:ext cx="322996" cy="0"/>
+          </a:xfrm>
+          <a:prstGeom prst="line">
+            <a:avLst/>
+          </a:prstGeom>
+          <a:ln w="12700">
+            <a:solidFill>
+              <a:srgbClr val="FF0000"/>
+            </a:solidFill>
+          </a:ln>
+        </p:spPr>
+        <p:style>
+          <a:lnRef idx="1">
+            <a:schemeClr val="accent1"/>
+          </a:lnRef>
+          <a:fillRef idx="0">
+            <a:schemeClr val="accent1"/>
+          </a:fillRef>
+          <a:effectRef idx="0">
+            <a:schemeClr val="accent1"/>
+          </a:effectRef>
+          <a:fontRef idx="minor">
+            <a:schemeClr val="tx1"/>
+          </a:fontRef>
+        </p:style>
+      </p:cxnSp>
+      <p:cxnSp>
+        <p:nvCxnSpPr>
+          <p:cNvPr id="34" name="Straight Connector 33">
+            <a:extLst>
+              <a:ext uri="{FF2B5EF4-FFF2-40B4-BE49-F238E27FC236}">
+                <a16:creationId xmlns:a16="http://schemas.microsoft.com/office/drawing/2014/main" id="{7D4A4D30-CB5C-574D-BFF0-92404A10BCC1}"/>
+              </a:ext>
+            </a:extLst>
+          </p:cNvPr>
+          <p:cNvCxnSpPr>
+            <a:cxnSpLocks/>
+            <a:stCxn id="53" idx="3"/>
+            <a:endCxn id="54" idx="1"/>
+          </p:cNvCxnSpPr>
+          <p:nvPr/>
+        </p:nvCxnSpPr>
+        <p:spPr>
+          <a:xfrm>
+            <a:off x="1438702" y="1808346"/>
+            <a:ext cx="322996" cy="0"/>
+          </a:xfrm>
+          <a:prstGeom prst="line">
+            <a:avLst/>
+          </a:prstGeom>
+          <a:ln w="12700">
+            <a:solidFill>
+              <a:srgbClr val="FF0000"/>
+            </a:solidFill>
+          </a:ln>
+        </p:spPr>
+        <p:style>
+          <a:lnRef idx="1">
+            <a:schemeClr val="accent1"/>
+          </a:lnRef>
+          <a:fillRef idx="0">
+            <a:schemeClr val="accent1"/>
+          </a:fillRef>
+          <a:effectRef idx="0">
+            <a:schemeClr val="accent1"/>
+          </a:effectRef>
+          <a:fontRef idx="minor">
+            <a:schemeClr val="tx1"/>
+          </a:fontRef>
+        </p:style>
+      </p:cxnSp>
+      <p:cxnSp>
+        <p:nvCxnSpPr>
+          <p:cNvPr id="37" name="Straight Connector 36">
+            <a:extLst>
+              <a:ext uri="{FF2B5EF4-FFF2-40B4-BE49-F238E27FC236}">
+                <a16:creationId xmlns:a16="http://schemas.microsoft.com/office/drawing/2014/main" id="{3155B6E5-1D66-E548-8367-DE558338C0CA}"/>
+              </a:ext>
+            </a:extLst>
+          </p:cNvPr>
+          <p:cNvCxnSpPr>
+            <a:cxnSpLocks/>
+            <a:stCxn id="57" idx="3"/>
+            <a:endCxn id="58" idx="1"/>
+          </p:cNvCxnSpPr>
+          <p:nvPr/>
+        </p:nvCxnSpPr>
+        <p:spPr>
+          <a:xfrm>
+            <a:off x="1438702" y="2575888"/>
+            <a:ext cx="322996" cy="0"/>
+          </a:xfrm>
+          <a:prstGeom prst="line">
+            <a:avLst/>
+          </a:prstGeom>
+          <a:ln w="12700">
+            <a:solidFill>
+              <a:srgbClr val="FF0000"/>
+            </a:solidFill>
+          </a:ln>
+        </p:spPr>
+        <p:style>
+          <a:lnRef idx="1">
+            <a:schemeClr val="accent1"/>
+          </a:lnRef>
+          <a:fillRef idx="0">
+            <a:schemeClr val="accent1"/>
+          </a:fillRef>
+          <a:effectRef idx="0">
+            <a:schemeClr val="accent1"/>
+          </a:effectRef>
+          <a:fontRef idx="minor">
+            <a:schemeClr val="tx1"/>
+          </a:fontRef>
+        </p:style>
+      </p:cxnSp>
+      <p:cxnSp>
+        <p:nvCxnSpPr>
+          <p:cNvPr id="40" name="Straight Connector 39">
+            <a:extLst>
+              <a:ext uri="{FF2B5EF4-FFF2-40B4-BE49-F238E27FC236}">
+                <a16:creationId xmlns:a16="http://schemas.microsoft.com/office/drawing/2014/main" id="{2C50B67A-FFEC-0440-93F0-EB1ADABE36CB}"/>
+              </a:ext>
+            </a:extLst>
+          </p:cNvPr>
+          <p:cNvCxnSpPr>
+            <a:cxnSpLocks/>
+            <a:stCxn id="59" idx="2"/>
+            <a:endCxn id="60" idx="5"/>
+          </p:cNvCxnSpPr>
+          <p:nvPr/>
+        </p:nvCxnSpPr>
+        <p:spPr>
+          <a:xfrm>
+            <a:off x="1397213" y="3329956"/>
+            <a:ext cx="405975" cy="0"/>
+          </a:xfrm>
+          <a:prstGeom prst="line">
+            <a:avLst/>
+          </a:prstGeom>
+          <a:ln w="12700">
+            <a:solidFill>
+              <a:srgbClr val="FF0000"/>
+            </a:solidFill>
+          </a:ln>
+        </p:spPr>
+        <p:style>
+          <a:lnRef idx="1">
+            <a:schemeClr val="accent1"/>
+          </a:lnRef>
+          <a:fillRef idx="0">
+            <a:schemeClr val="accent1"/>
+          </a:fillRef>
+          <a:effectRef idx="0">
+            <a:schemeClr val="accent1"/>
+          </a:effectRef>
+          <a:fontRef idx="minor">
+            <a:schemeClr val="tx1"/>
+          </a:fontRef>
+        </p:style>
+      </p:cxnSp>
     </p:spTree>
     <p:extLst>
       <p:ext uri="{BB962C8B-B14F-4D97-AF65-F5344CB8AC3E}">
-        <p14:creationId xmlns:p14="http://schemas.microsoft.com/office/powerpoint/2010/main" val="2461037524"/>
+        <p14:creationId xmlns:p14="http://schemas.microsoft.com/office/powerpoint/2010/main" val="3137757566"/>
       </p:ext>
     </p:extLst>
   </p:cSld>

</xml_diff>